<commit_message>
DeveloperGuide: update Ui component info
UiPartLoader does not exist anymore. All UiParts can be directly
constructed via `new SomeUiPart()`.
</commit_message>
<xml_diff>
--- a/docs/diagrams/UiComponentClassDiagram.pptx
+++ b/docs/diagrams/UiComponentClassDiagram.pptx
@@ -1,6 +1,6 @@
 
 <file path=ppt/presentation.xml><?xml version="1.0" encoding="utf-8"?>
-<p:presentation xmlns:a="http://schemas.openxmlformats.org/drawingml/2006/main" xmlns:r="http://schemas.openxmlformats.org/officeDocument/2006/relationships" xmlns:p="http://schemas.openxmlformats.org/presentationml/2006/main" saveSubsetFonts="1">
+<p:presentation xmlns:a="http://schemas.openxmlformats.org/drawingml/2006/main" xmlns:r="http://schemas.openxmlformats.org/officeDocument/2006/relationships" xmlns:p="http://schemas.openxmlformats.org/presentationml/2006/main" removePersonalInfoOnSave="1" saveSubsetFonts="1">
   <p:sldMasterIdLst>
     <p:sldMasterId id="2147483648" r:id="rId1"/>
   </p:sldMasterIdLst>
@@ -107,6 +107,22 @@
       </a:defRPr>
     </a:lvl9pPr>
   </p:defaultTextStyle>
+  <p:extLst>
+    <p:ext uri="{EFAFB233-063F-42B5-8137-9DF3F51BA10A}">
+      <p15:sldGuideLst xmlns:p15="http://schemas.microsoft.com/office/powerpoint/2012/main">
+        <p15:guide id="1" orient="horz" pos="1488">
+          <p15:clr>
+            <a:srgbClr val="A4A3A4"/>
+          </p15:clr>
+        </p15:guide>
+        <p15:guide id="2" pos="2880">
+          <p15:clr>
+            <a:srgbClr val="A4A3A4"/>
+          </p15:clr>
+        </p15:guide>
+      </p15:sldGuideLst>
+    </p:ext>
+  </p:extLst>
 </p:presentation>
 </file>
 
@@ -192,7 +208,7 @@
           <a:p>
             <a:fld id="{F5CC4B3F-88C1-4FFA-B1B6-F41C21DC6924}" type="datetimeFigureOut">
               <a:rPr lang="en-US" smtClean="0"/>
-              <a:t>10/15/2016</a:t>
+              <a:t>1/7/2017</a:t>
             </a:fld>
             <a:endParaRPr lang="en-US"/>
           </a:p>
@@ -256,38 +272,37 @@
           <a:p>
             <a:pPr lvl="0"/>
             <a:r>
-              <a:rPr lang="en-US" smtClean="0"/>
+              <a:rPr lang="en-US"/>
               <a:t>Click to edit Master text styles</a:t>
             </a:r>
           </a:p>
           <a:p>
             <a:pPr lvl="1"/>
             <a:r>
-              <a:rPr lang="en-US" smtClean="0"/>
+              <a:rPr lang="en-US"/>
               <a:t>Second level</a:t>
             </a:r>
           </a:p>
           <a:p>
             <a:pPr lvl="2"/>
             <a:r>
-              <a:rPr lang="en-US" smtClean="0"/>
+              <a:rPr lang="en-US"/>
               <a:t>Third level</a:t>
             </a:r>
           </a:p>
           <a:p>
             <a:pPr lvl="3"/>
             <a:r>
-              <a:rPr lang="en-US" smtClean="0"/>
+              <a:rPr lang="en-US"/>
               <a:t>Fourth level</a:t>
             </a:r>
           </a:p>
           <a:p>
             <a:pPr lvl="4"/>
             <a:r>
-              <a:rPr lang="en-US" smtClean="0"/>
+              <a:rPr lang="en-US"/>
               <a:t>Fifth level</a:t>
             </a:r>
-            <a:endParaRPr lang="en-US"/>
           </a:p>
         </p:txBody>
       </p:sp>
@@ -498,10 +513,9 @@
           <a:lstStyle/>
           <a:p>
             <a:r>
-              <a:rPr lang="en-US" smtClean="0"/>
+              <a:rPr lang="en-US"/>
               <a:t>Click to edit Master title style</a:t>
             </a:r>
-            <a:endParaRPr lang="en-US"/>
           </a:p>
         </p:txBody>
       </p:sp>
@@ -617,10 +631,9 @@
           </a:lstStyle>
           <a:p>
             <a:r>
-              <a:rPr lang="en-US" smtClean="0"/>
+              <a:rPr lang="en-US"/>
               <a:t>Click to edit Master subtitle style</a:t>
             </a:r>
-            <a:endParaRPr lang="en-US"/>
           </a:p>
         </p:txBody>
       </p:sp>
@@ -641,7 +654,7 @@
           <a:p>
             <a:fld id="{78C97017-6FC3-485B-9764-EAC9E56C1D49}" type="datetimeFigureOut">
               <a:rPr lang="en-US" smtClean="0"/>
-              <a:t>10/15/2016</a:t>
+              <a:t>1/7/2017</a:t>
             </a:fld>
             <a:endParaRPr lang="en-US"/>
           </a:p>
@@ -735,10 +748,9 @@
           <a:lstStyle/>
           <a:p>
             <a:r>
-              <a:rPr lang="en-US" smtClean="0"/>
+              <a:rPr lang="en-US"/>
               <a:t>Click to edit Master title style</a:t>
             </a:r>
-            <a:endParaRPr lang="en-US"/>
           </a:p>
         </p:txBody>
       </p:sp>
@@ -759,38 +771,37 @@
           <a:p>
             <a:pPr lvl="0"/>
             <a:r>
-              <a:rPr lang="en-US" smtClean="0"/>
+              <a:rPr lang="en-US"/>
               <a:t>Click to edit Master text styles</a:t>
             </a:r>
           </a:p>
           <a:p>
             <a:pPr lvl="1"/>
             <a:r>
-              <a:rPr lang="en-US" smtClean="0"/>
+              <a:rPr lang="en-US"/>
               <a:t>Second level</a:t>
             </a:r>
           </a:p>
           <a:p>
             <a:pPr lvl="2"/>
             <a:r>
-              <a:rPr lang="en-US" smtClean="0"/>
+              <a:rPr lang="en-US"/>
               <a:t>Third level</a:t>
             </a:r>
           </a:p>
           <a:p>
             <a:pPr lvl="3"/>
             <a:r>
-              <a:rPr lang="en-US" smtClean="0"/>
+              <a:rPr lang="en-US"/>
               <a:t>Fourth level</a:t>
             </a:r>
           </a:p>
           <a:p>
             <a:pPr lvl="4"/>
             <a:r>
-              <a:rPr lang="en-US" smtClean="0"/>
+              <a:rPr lang="en-US"/>
               <a:t>Fifth level</a:t>
             </a:r>
-            <a:endParaRPr lang="en-US"/>
           </a:p>
         </p:txBody>
       </p:sp>
@@ -811,7 +822,7 @@
           <a:p>
             <a:fld id="{78C97017-6FC3-485B-9764-EAC9E56C1D49}" type="datetimeFigureOut">
               <a:rPr lang="en-US" smtClean="0"/>
-              <a:t>10/15/2016</a:t>
+              <a:t>1/7/2017</a:t>
             </a:fld>
             <a:endParaRPr lang="en-US"/>
           </a:p>
@@ -910,10 +921,9 @@
           <a:lstStyle/>
           <a:p>
             <a:r>
-              <a:rPr lang="en-US" smtClean="0"/>
+              <a:rPr lang="en-US"/>
               <a:t>Click to edit Master title style</a:t>
             </a:r>
-            <a:endParaRPr lang="en-US"/>
           </a:p>
         </p:txBody>
       </p:sp>
@@ -939,38 +949,37 @@
           <a:p>
             <a:pPr lvl="0"/>
             <a:r>
-              <a:rPr lang="en-US" smtClean="0"/>
+              <a:rPr lang="en-US"/>
               <a:t>Click to edit Master text styles</a:t>
             </a:r>
           </a:p>
           <a:p>
             <a:pPr lvl="1"/>
             <a:r>
-              <a:rPr lang="en-US" smtClean="0"/>
+              <a:rPr lang="en-US"/>
               <a:t>Second level</a:t>
             </a:r>
           </a:p>
           <a:p>
             <a:pPr lvl="2"/>
             <a:r>
-              <a:rPr lang="en-US" smtClean="0"/>
+              <a:rPr lang="en-US"/>
               <a:t>Third level</a:t>
             </a:r>
           </a:p>
           <a:p>
             <a:pPr lvl="3"/>
             <a:r>
-              <a:rPr lang="en-US" smtClean="0"/>
+              <a:rPr lang="en-US"/>
               <a:t>Fourth level</a:t>
             </a:r>
           </a:p>
           <a:p>
             <a:pPr lvl="4"/>
             <a:r>
-              <a:rPr lang="en-US" smtClean="0"/>
+              <a:rPr lang="en-US"/>
               <a:t>Fifth level</a:t>
             </a:r>
-            <a:endParaRPr lang="en-US"/>
           </a:p>
         </p:txBody>
       </p:sp>
@@ -991,7 +1000,7 @@
           <a:p>
             <a:fld id="{78C97017-6FC3-485B-9764-EAC9E56C1D49}" type="datetimeFigureOut">
               <a:rPr lang="en-US" smtClean="0"/>
-              <a:t>10/15/2016</a:t>
+              <a:t>1/7/2017</a:t>
             </a:fld>
             <a:endParaRPr lang="en-US"/>
           </a:p>
@@ -1085,10 +1094,9 @@
           <a:lstStyle/>
           <a:p>
             <a:r>
-              <a:rPr lang="en-US" smtClean="0"/>
+              <a:rPr lang="en-US"/>
               <a:t>Click to edit Master title style</a:t>
             </a:r>
-            <a:endParaRPr lang="en-US"/>
           </a:p>
         </p:txBody>
       </p:sp>
@@ -1109,38 +1117,37 @@
           <a:p>
             <a:pPr lvl="0"/>
             <a:r>
-              <a:rPr lang="en-US" smtClean="0"/>
+              <a:rPr lang="en-US"/>
               <a:t>Click to edit Master text styles</a:t>
             </a:r>
           </a:p>
           <a:p>
             <a:pPr lvl="1"/>
             <a:r>
-              <a:rPr lang="en-US" smtClean="0"/>
+              <a:rPr lang="en-US"/>
               <a:t>Second level</a:t>
             </a:r>
           </a:p>
           <a:p>
             <a:pPr lvl="2"/>
             <a:r>
-              <a:rPr lang="en-US" smtClean="0"/>
+              <a:rPr lang="en-US"/>
               <a:t>Third level</a:t>
             </a:r>
           </a:p>
           <a:p>
             <a:pPr lvl="3"/>
             <a:r>
-              <a:rPr lang="en-US" smtClean="0"/>
+              <a:rPr lang="en-US"/>
               <a:t>Fourth level</a:t>
             </a:r>
           </a:p>
           <a:p>
             <a:pPr lvl="4"/>
             <a:r>
-              <a:rPr lang="en-US" smtClean="0"/>
+              <a:rPr lang="en-US"/>
               <a:t>Fifth level</a:t>
             </a:r>
-            <a:endParaRPr lang="en-US"/>
           </a:p>
         </p:txBody>
       </p:sp>
@@ -1161,7 +1168,7 @@
           <a:p>
             <a:fld id="{78C97017-6FC3-485B-9764-EAC9E56C1D49}" type="datetimeFigureOut">
               <a:rPr lang="en-US" smtClean="0"/>
-              <a:t>10/15/2016</a:t>
+              <a:t>1/7/2017</a:t>
             </a:fld>
             <a:endParaRPr lang="en-US"/>
           </a:p>
@@ -1264,10 +1271,9 @@
           </a:lstStyle>
           <a:p>
             <a:r>
-              <a:rPr lang="en-US" smtClean="0"/>
+              <a:rPr lang="en-US"/>
               <a:t>Click to edit Master title style</a:t>
             </a:r>
-            <a:endParaRPr lang="en-US"/>
           </a:p>
         </p:txBody>
       </p:sp>
@@ -1384,7 +1390,7 @@
           <a:p>
             <a:pPr lvl="0"/>
             <a:r>
-              <a:rPr lang="en-US" smtClean="0"/>
+              <a:rPr lang="en-US"/>
               <a:t>Click to edit Master text styles</a:t>
             </a:r>
           </a:p>
@@ -1407,7 +1413,7 @@
           <a:p>
             <a:fld id="{78C97017-6FC3-485B-9764-EAC9E56C1D49}" type="datetimeFigureOut">
               <a:rPr lang="en-US" smtClean="0"/>
-              <a:t>10/15/2016</a:t>
+              <a:t>1/7/2017</a:t>
             </a:fld>
             <a:endParaRPr lang="en-US"/>
           </a:p>
@@ -1501,10 +1507,9 @@
           <a:lstStyle/>
           <a:p>
             <a:r>
-              <a:rPr lang="en-US" smtClean="0"/>
+              <a:rPr lang="en-US"/>
               <a:t>Click to edit Master title style</a:t>
             </a:r>
-            <a:endParaRPr lang="en-US"/>
           </a:p>
         </p:txBody>
       </p:sp>
@@ -1558,38 +1563,37 @@
           <a:p>
             <a:pPr lvl="0"/>
             <a:r>
-              <a:rPr lang="en-US" smtClean="0"/>
+              <a:rPr lang="en-US"/>
               <a:t>Click to edit Master text styles</a:t>
             </a:r>
           </a:p>
           <a:p>
             <a:pPr lvl="1"/>
             <a:r>
-              <a:rPr lang="en-US" smtClean="0"/>
+              <a:rPr lang="en-US"/>
               <a:t>Second level</a:t>
             </a:r>
           </a:p>
           <a:p>
             <a:pPr lvl="2"/>
             <a:r>
-              <a:rPr lang="en-US" smtClean="0"/>
+              <a:rPr lang="en-US"/>
               <a:t>Third level</a:t>
             </a:r>
           </a:p>
           <a:p>
             <a:pPr lvl="3"/>
             <a:r>
-              <a:rPr lang="en-US" smtClean="0"/>
+              <a:rPr lang="en-US"/>
               <a:t>Fourth level</a:t>
             </a:r>
           </a:p>
           <a:p>
             <a:pPr lvl="4"/>
             <a:r>
-              <a:rPr lang="en-US" smtClean="0"/>
+              <a:rPr lang="en-US"/>
               <a:t>Fifth level</a:t>
             </a:r>
-            <a:endParaRPr lang="en-US"/>
           </a:p>
         </p:txBody>
       </p:sp>
@@ -1643,38 +1647,37 @@
           <a:p>
             <a:pPr lvl="0"/>
             <a:r>
-              <a:rPr lang="en-US" smtClean="0"/>
+              <a:rPr lang="en-US"/>
               <a:t>Click to edit Master text styles</a:t>
             </a:r>
           </a:p>
           <a:p>
             <a:pPr lvl="1"/>
             <a:r>
-              <a:rPr lang="en-US" smtClean="0"/>
+              <a:rPr lang="en-US"/>
               <a:t>Second level</a:t>
             </a:r>
           </a:p>
           <a:p>
             <a:pPr lvl="2"/>
             <a:r>
-              <a:rPr lang="en-US" smtClean="0"/>
+              <a:rPr lang="en-US"/>
               <a:t>Third level</a:t>
             </a:r>
           </a:p>
           <a:p>
             <a:pPr lvl="3"/>
             <a:r>
-              <a:rPr lang="en-US" smtClean="0"/>
+              <a:rPr lang="en-US"/>
               <a:t>Fourth level</a:t>
             </a:r>
           </a:p>
           <a:p>
             <a:pPr lvl="4"/>
             <a:r>
-              <a:rPr lang="en-US" smtClean="0"/>
+              <a:rPr lang="en-US"/>
               <a:t>Fifth level</a:t>
             </a:r>
-            <a:endParaRPr lang="en-US"/>
           </a:p>
         </p:txBody>
       </p:sp>
@@ -1695,7 +1698,7 @@
           <a:p>
             <a:fld id="{78C97017-6FC3-485B-9764-EAC9E56C1D49}" type="datetimeFigureOut">
               <a:rPr lang="en-US" smtClean="0"/>
-              <a:t>10/15/2016</a:t>
+              <a:t>1/7/2017</a:t>
             </a:fld>
             <a:endParaRPr lang="en-US"/>
           </a:p>
@@ -1793,10 +1796,9 @@
           </a:lstStyle>
           <a:p>
             <a:r>
-              <a:rPr lang="en-US" smtClean="0"/>
+              <a:rPr lang="en-US"/>
               <a:t>Click to edit Master title style</a:t>
             </a:r>
-            <a:endParaRPr lang="en-US"/>
           </a:p>
         </p:txBody>
       </p:sp>
@@ -1859,7 +1861,7 @@
           <a:p>
             <a:pPr lvl="0"/>
             <a:r>
-              <a:rPr lang="en-US" smtClean="0"/>
+              <a:rPr lang="en-US"/>
               <a:t>Click to edit Master text styles</a:t>
             </a:r>
           </a:p>
@@ -1915,38 +1917,37 @@
           <a:p>
             <a:pPr lvl="0"/>
             <a:r>
-              <a:rPr lang="en-US" smtClean="0"/>
+              <a:rPr lang="en-US"/>
               <a:t>Click to edit Master text styles</a:t>
             </a:r>
           </a:p>
           <a:p>
             <a:pPr lvl="1"/>
             <a:r>
-              <a:rPr lang="en-US" smtClean="0"/>
+              <a:rPr lang="en-US"/>
               <a:t>Second level</a:t>
             </a:r>
           </a:p>
           <a:p>
             <a:pPr lvl="2"/>
             <a:r>
-              <a:rPr lang="en-US" smtClean="0"/>
+              <a:rPr lang="en-US"/>
               <a:t>Third level</a:t>
             </a:r>
           </a:p>
           <a:p>
             <a:pPr lvl="3"/>
             <a:r>
-              <a:rPr lang="en-US" smtClean="0"/>
+              <a:rPr lang="en-US"/>
               <a:t>Fourth level</a:t>
             </a:r>
           </a:p>
           <a:p>
             <a:pPr lvl="4"/>
             <a:r>
-              <a:rPr lang="en-US" smtClean="0"/>
+              <a:rPr lang="en-US"/>
               <a:t>Fifth level</a:t>
             </a:r>
-            <a:endParaRPr lang="en-US"/>
           </a:p>
         </p:txBody>
       </p:sp>
@@ -2009,7 +2010,7 @@
           <a:p>
             <a:pPr lvl="0"/>
             <a:r>
-              <a:rPr lang="en-US" smtClean="0"/>
+              <a:rPr lang="en-US"/>
               <a:t>Click to edit Master text styles</a:t>
             </a:r>
           </a:p>
@@ -2065,38 +2066,37 @@
           <a:p>
             <a:pPr lvl="0"/>
             <a:r>
-              <a:rPr lang="en-US" smtClean="0"/>
+              <a:rPr lang="en-US"/>
               <a:t>Click to edit Master text styles</a:t>
             </a:r>
           </a:p>
           <a:p>
             <a:pPr lvl="1"/>
             <a:r>
-              <a:rPr lang="en-US" smtClean="0"/>
+              <a:rPr lang="en-US"/>
               <a:t>Second level</a:t>
             </a:r>
           </a:p>
           <a:p>
             <a:pPr lvl="2"/>
             <a:r>
-              <a:rPr lang="en-US" smtClean="0"/>
+              <a:rPr lang="en-US"/>
               <a:t>Third level</a:t>
             </a:r>
           </a:p>
           <a:p>
             <a:pPr lvl="3"/>
             <a:r>
-              <a:rPr lang="en-US" smtClean="0"/>
+              <a:rPr lang="en-US"/>
               <a:t>Fourth level</a:t>
             </a:r>
           </a:p>
           <a:p>
             <a:pPr lvl="4"/>
             <a:r>
-              <a:rPr lang="en-US" smtClean="0"/>
+              <a:rPr lang="en-US"/>
               <a:t>Fifth level</a:t>
             </a:r>
-            <a:endParaRPr lang="en-US"/>
           </a:p>
         </p:txBody>
       </p:sp>
@@ -2117,7 +2117,7 @@
           <a:p>
             <a:fld id="{78C97017-6FC3-485B-9764-EAC9E56C1D49}" type="datetimeFigureOut">
               <a:rPr lang="en-US" smtClean="0"/>
-              <a:t>10/15/2016</a:t>
+              <a:t>1/7/2017</a:t>
             </a:fld>
             <a:endParaRPr lang="en-US"/>
           </a:p>
@@ -2211,10 +2211,9 @@
           <a:lstStyle/>
           <a:p>
             <a:r>
-              <a:rPr lang="en-US" smtClean="0"/>
+              <a:rPr lang="en-US"/>
               <a:t>Click to edit Master title style</a:t>
             </a:r>
-            <a:endParaRPr lang="en-US"/>
           </a:p>
         </p:txBody>
       </p:sp>
@@ -2235,7 +2234,7 @@
           <a:p>
             <a:fld id="{78C97017-6FC3-485B-9764-EAC9E56C1D49}" type="datetimeFigureOut">
               <a:rPr lang="en-US" smtClean="0"/>
-              <a:t>10/15/2016</a:t>
+              <a:t>1/7/2017</a:t>
             </a:fld>
             <a:endParaRPr lang="en-US"/>
           </a:p>
@@ -2330,7 +2329,7 @@
           <a:p>
             <a:fld id="{78C97017-6FC3-485B-9764-EAC9E56C1D49}" type="datetimeFigureOut">
               <a:rPr lang="en-US" smtClean="0"/>
-              <a:t>10/15/2016</a:t>
+              <a:t>1/7/2017</a:t>
             </a:fld>
             <a:endParaRPr lang="en-US"/>
           </a:p>
@@ -2433,10 +2432,9 @@
           </a:lstStyle>
           <a:p>
             <a:r>
-              <a:rPr lang="en-US" smtClean="0"/>
+              <a:rPr lang="en-US"/>
               <a:t>Click to edit Master title style</a:t>
             </a:r>
-            <a:endParaRPr lang="en-US"/>
           </a:p>
         </p:txBody>
       </p:sp>
@@ -2490,38 +2488,37 @@
           <a:p>
             <a:pPr lvl="0"/>
             <a:r>
-              <a:rPr lang="en-US" smtClean="0"/>
+              <a:rPr lang="en-US"/>
               <a:t>Click to edit Master text styles</a:t>
             </a:r>
           </a:p>
           <a:p>
             <a:pPr lvl="1"/>
             <a:r>
-              <a:rPr lang="en-US" smtClean="0"/>
+              <a:rPr lang="en-US"/>
               <a:t>Second level</a:t>
             </a:r>
           </a:p>
           <a:p>
             <a:pPr lvl="2"/>
             <a:r>
-              <a:rPr lang="en-US" smtClean="0"/>
+              <a:rPr lang="en-US"/>
               <a:t>Third level</a:t>
             </a:r>
           </a:p>
           <a:p>
             <a:pPr lvl="3"/>
             <a:r>
-              <a:rPr lang="en-US" smtClean="0"/>
+              <a:rPr lang="en-US"/>
               <a:t>Fourth level</a:t>
             </a:r>
           </a:p>
           <a:p>
             <a:pPr lvl="4"/>
             <a:r>
-              <a:rPr lang="en-US" smtClean="0"/>
+              <a:rPr lang="en-US"/>
               <a:t>Fifth level</a:t>
             </a:r>
-            <a:endParaRPr lang="en-US"/>
           </a:p>
         </p:txBody>
       </p:sp>
@@ -2584,7 +2581,7 @@
           <a:p>
             <a:pPr lvl="0"/>
             <a:r>
-              <a:rPr lang="en-US" smtClean="0"/>
+              <a:rPr lang="en-US"/>
               <a:t>Click to edit Master text styles</a:t>
             </a:r>
           </a:p>
@@ -2607,7 +2604,7 @@
           <a:p>
             <a:fld id="{78C97017-6FC3-485B-9764-EAC9E56C1D49}" type="datetimeFigureOut">
               <a:rPr lang="en-US" smtClean="0"/>
-              <a:t>10/15/2016</a:t>
+              <a:t>1/7/2017</a:t>
             </a:fld>
             <a:endParaRPr lang="en-US"/>
           </a:p>
@@ -2710,10 +2707,9 @@
           </a:lstStyle>
           <a:p>
             <a:r>
-              <a:rPr lang="en-US" smtClean="0"/>
+              <a:rPr lang="en-US"/>
               <a:t>Click to edit Master title style</a:t>
             </a:r>
-            <a:endParaRPr lang="en-US"/>
           </a:p>
         </p:txBody>
       </p:sp>
@@ -2837,7 +2833,7 @@
           <a:p>
             <a:pPr lvl="0"/>
             <a:r>
-              <a:rPr lang="en-US" smtClean="0"/>
+              <a:rPr lang="en-US"/>
               <a:t>Click to edit Master text styles</a:t>
             </a:r>
           </a:p>
@@ -2860,7 +2856,7 @@
           <a:p>
             <a:fld id="{78C97017-6FC3-485B-9764-EAC9E56C1D49}" type="datetimeFigureOut">
               <a:rPr lang="en-US" smtClean="0"/>
-              <a:t>10/15/2016</a:t>
+              <a:t>1/7/2017</a:t>
             </a:fld>
             <a:endParaRPr lang="en-US"/>
           </a:p>
@@ -2969,10 +2965,9 @@
           <a:lstStyle/>
           <a:p>
             <a:r>
-              <a:rPr lang="en-US" smtClean="0"/>
+              <a:rPr lang="en-US"/>
               <a:t>Click to edit Master title style</a:t>
             </a:r>
-            <a:endParaRPr lang="en-US"/>
           </a:p>
         </p:txBody>
       </p:sp>
@@ -3003,38 +2998,37 @@
           <a:p>
             <a:pPr lvl="0"/>
             <a:r>
-              <a:rPr lang="en-US" smtClean="0"/>
+              <a:rPr lang="en-US"/>
               <a:t>Click to edit Master text styles</a:t>
             </a:r>
           </a:p>
           <a:p>
             <a:pPr lvl="1"/>
             <a:r>
-              <a:rPr lang="en-US" smtClean="0"/>
+              <a:rPr lang="en-US"/>
               <a:t>Second level</a:t>
             </a:r>
           </a:p>
           <a:p>
             <a:pPr lvl="2"/>
             <a:r>
-              <a:rPr lang="en-US" smtClean="0"/>
+              <a:rPr lang="en-US"/>
               <a:t>Third level</a:t>
             </a:r>
           </a:p>
           <a:p>
             <a:pPr lvl="3"/>
             <a:r>
-              <a:rPr lang="en-US" smtClean="0"/>
+              <a:rPr lang="en-US"/>
               <a:t>Fourth level</a:t>
             </a:r>
           </a:p>
           <a:p>
             <a:pPr lvl="4"/>
             <a:r>
-              <a:rPr lang="en-US" smtClean="0"/>
+              <a:rPr lang="en-US"/>
               <a:t>Fifth level</a:t>
             </a:r>
-            <a:endParaRPr lang="en-US"/>
           </a:p>
         </p:txBody>
       </p:sp>
@@ -3073,7 +3067,7 @@
           <a:p>
             <a:fld id="{78C97017-6FC3-485B-9764-EAC9E56C1D49}" type="datetimeFigureOut">
               <a:rPr lang="en-US" smtClean="0"/>
-              <a:t>10/15/2016</a:t>
+              <a:t>1/7/2017</a:t>
             </a:fld>
             <a:endParaRPr lang="en-US"/>
           </a:p>
@@ -3491,7 +3485,7 @@
           <a:lstStyle/>
           <a:p>
             <a:r>
-              <a:rPr lang="en-US" sz="1200" b="1" dirty="0" smtClean="0">
+              <a:rPr lang="en-US" sz="1200" b="1" dirty="0">
                 <a:solidFill>
                   <a:schemeClr val="accent3">
                     <a:lumMod val="75000"/>
@@ -3674,7 +3668,7 @@
           <a:p>
             <a:pPr algn="ctr"/>
             <a:r>
-              <a:rPr lang="en-US" sz="1050" dirty="0" err="1" smtClean="0">
+              <a:rPr lang="en-US" sz="1050" dirty="0" err="1">
                 <a:solidFill>
                   <a:schemeClr val="bg1"/>
                 </a:solidFill>
@@ -4313,7 +4307,7 @@
           <a:p>
             <a:pPr algn="ctr"/>
             <a:r>
-              <a:rPr lang="en-US" sz="1050" b="1" dirty="0" err="1" smtClean="0">
+              <a:rPr lang="en-US" sz="1050" b="1" dirty="0" err="1">
                 <a:solidFill>
                   <a:schemeClr val="accent3">
                     <a:lumMod val="75000"/>
@@ -4536,7 +4530,7 @@
           <a:p>
             <a:pPr algn="ctr"/>
             <a:r>
-              <a:rPr lang="en-US" sz="1050" b="1" dirty="0" smtClean="0">
+              <a:rPr lang="en-US" sz="1050" b="1" dirty="0">
                 <a:solidFill>
                   <a:schemeClr val="accent3">
                     <a:lumMod val="75000"/>
@@ -4546,7 +4540,7 @@
               <a:t>{abstract}</a:t>
             </a:r>
             <a:br>
-              <a:rPr lang="en-US" sz="1050" b="1" dirty="0" smtClean="0">
+              <a:rPr lang="en-US" sz="1050" b="1" dirty="0">
                 <a:solidFill>
                   <a:schemeClr val="accent3">
                     <a:lumMod val="75000"/>
@@ -4555,7 +4549,7 @@
               </a:rPr>
             </a:br>
             <a:r>
-              <a:rPr lang="en-US" sz="1050" b="1" dirty="0" err="1" smtClean="0">
+              <a:rPr lang="en-US" sz="1050" b="1" dirty="0" err="1">
                 <a:solidFill>
                   <a:schemeClr val="accent3">
                     <a:lumMod val="75000"/>
@@ -4820,65 +4814,6 @@
           </a:fontRef>
         </p:style>
       </p:cxnSp>
-      <p:sp>
-        <p:nvSpPr>
-          <p:cNvPr id="98" name="Rectangle 62"/>
-          <p:cNvSpPr/>
-          <p:nvPr/>
-        </p:nvSpPr>
-        <p:spPr>
-          <a:xfrm>
-            <a:off x="3657600" y="1770924"/>
-            <a:ext cx="1031399" cy="346760"/>
-          </a:xfrm>
-          <a:prstGeom prst="rect">
-            <a:avLst/>
-          </a:prstGeom>
-          <a:solidFill>
-            <a:srgbClr val="00B050"/>
-          </a:solidFill>
-          <a:ln w="19050">
-            <a:solidFill>
-              <a:srgbClr val="00B050"/>
-            </a:solidFill>
-          </a:ln>
-          <a:effectLst/>
-        </p:spPr>
-        <p:style>
-          <a:lnRef idx="1">
-            <a:schemeClr val="accent2"/>
-          </a:lnRef>
-          <a:fillRef idx="2">
-            <a:schemeClr val="accent2"/>
-          </a:fillRef>
-          <a:effectRef idx="1">
-            <a:schemeClr val="accent2"/>
-          </a:effectRef>
-          <a:fontRef idx="minor">
-            <a:schemeClr val="dk1"/>
-          </a:fontRef>
-        </p:style>
-        <p:txBody>
-          <a:bodyPr rtlCol="0" anchor="ctr"/>
-          <a:lstStyle/>
-          <a:p>
-            <a:pPr algn="ctr"/>
-            <a:r>
-              <a:rPr lang="en-US" sz="1050" dirty="0" err="1">
-                <a:solidFill>
-                  <a:schemeClr val="bg1"/>
-                </a:solidFill>
-              </a:rPr>
-              <a:t>UiPartLoader</a:t>
-            </a:r>
-            <a:endParaRPr lang="en-SG" sz="1050" dirty="0">
-              <a:solidFill>
-                <a:schemeClr val="bg1"/>
-              </a:solidFill>
-            </a:endParaRPr>
-          </a:p>
-        </p:txBody>
-      </p:sp>
       <p:cxnSp>
         <p:nvCxnSpPr>
           <p:cNvPr id="107" name="Elbow Connector 106"/>
@@ -4900,85 +4835,6 @@
               <a:srgbClr val="00B050"/>
             </a:solidFill>
             <a:prstDash val="solid"/>
-            <a:headEnd type="none" w="med" len="med"/>
-            <a:tailEnd type="arrow" w="med" len="med"/>
-          </a:ln>
-          <a:effectLst/>
-        </p:spPr>
-        <p:style>
-          <a:lnRef idx="1">
-            <a:schemeClr val="accent2"/>
-          </a:lnRef>
-          <a:fillRef idx="2">
-            <a:schemeClr val="accent2"/>
-          </a:fillRef>
-          <a:effectRef idx="1">
-            <a:schemeClr val="accent2"/>
-          </a:effectRef>
-          <a:fontRef idx="minor">
-            <a:schemeClr val="dk1"/>
-          </a:fontRef>
-        </p:style>
-      </p:cxnSp>
-      <p:cxnSp>
-        <p:nvCxnSpPr>
-          <p:cNvPr id="110" name="Straight Arrow Connector 109"/>
-          <p:cNvCxnSpPr/>
-          <p:nvPr/>
-        </p:nvCxnSpPr>
-        <p:spPr>
-          <a:xfrm flipV="1">
-            <a:off x="3198609" y="1944304"/>
-            <a:ext cx="484448" cy="2308"/>
-          </a:xfrm>
-          <a:prstGeom prst="straightConnector1">
-            <a:avLst/>
-          </a:prstGeom>
-          <a:ln w="19050">
-            <a:solidFill>
-              <a:srgbClr val="00B050"/>
-            </a:solidFill>
-            <a:headEnd type="none" w="med" len="med"/>
-            <a:tailEnd type="arrow" w="med" len="med"/>
-          </a:ln>
-          <a:effectLst/>
-        </p:spPr>
-        <p:style>
-          <a:lnRef idx="1">
-            <a:schemeClr val="accent2"/>
-          </a:lnRef>
-          <a:fillRef idx="2">
-            <a:schemeClr val="accent2"/>
-          </a:fillRef>
-          <a:effectRef idx="1">
-            <a:schemeClr val="accent2"/>
-          </a:effectRef>
-          <a:fontRef idx="minor">
-            <a:schemeClr val="dk1"/>
-          </a:fontRef>
-        </p:style>
-      </p:cxnSp>
-      <p:cxnSp>
-        <p:nvCxnSpPr>
-          <p:cNvPr id="111" name="Straight Arrow Connector 110"/>
-          <p:cNvCxnSpPr>
-            <a:endCxn id="73" idx="1"/>
-          </p:cNvCxnSpPr>
-          <p:nvPr/>
-        </p:nvCxnSpPr>
-        <p:spPr>
-          <a:xfrm flipV="1">
-            <a:off x="4714456" y="1944304"/>
-            <a:ext cx="429492" cy="2308"/>
-          </a:xfrm>
-          <a:prstGeom prst="straightConnector1">
-            <a:avLst/>
-          </a:prstGeom>
-          <a:ln w="19050">
-            <a:solidFill>
-              <a:schemeClr val="accent3"/>
-            </a:solidFill>
-            <a:prstDash val="sysDot"/>
             <a:headEnd type="none" w="med" len="med"/>
             <a:tailEnd type="arrow" w="med" len="med"/>
           </a:ln>
@@ -5044,7 +4900,7 @@
           <a:p>
             <a:pPr algn="ctr"/>
             <a:r>
-              <a:rPr lang="en-US" sz="1100" b="1" dirty="0" smtClean="0">
+              <a:rPr lang="en-US" sz="1100" b="1" dirty="0">
                 <a:solidFill>
                   <a:schemeClr val="bg1"/>
                 </a:solidFill>
@@ -5103,7 +4959,7 @@
           <a:p>
             <a:pPr algn="ctr"/>
             <a:r>
-              <a:rPr lang="en-US" sz="1050" dirty="0" smtClean="0">
+              <a:rPr lang="en-US" sz="1050" dirty="0">
                 <a:solidFill>
                   <a:schemeClr val="bg1"/>
                 </a:solidFill>
@@ -5114,7 +4970,7 @@
           <a:p>
             <a:pPr algn="ctr"/>
             <a:r>
-              <a:rPr lang="en-US" sz="1050" dirty="0" err="1" smtClean="0">
+              <a:rPr lang="en-US" sz="1050" dirty="0" err="1">
                 <a:solidFill>
                   <a:schemeClr val="bg1"/>
                 </a:solidFill>
@@ -5663,13 +5519,6 @@
   <p:clrMapOvr>
     <a:masterClrMapping/>
   </p:clrMapOvr>
-  <p:timing>
-    <p:tnLst>
-      <p:par>
-        <p:cTn id="1" dur="indefinite" restart="never" nodeType="tmRoot"/>
-      </p:par>
-    </p:tnLst>
-  </p:timing>
 </p:sld>
 </file>
 

</xml_diff>

<commit_message>
Updated UiClassDiagram.png and added a few lines on the UI component structure
</commit_message>
<xml_diff>
--- a/docs/diagrams/UiComponentClassDiagram.pptx
+++ b/docs/diagrams/UiComponentClassDiagram.pptx
@@ -208,7 +208,7 @@
           <a:p>
             <a:fld id="{F5CC4B3F-88C1-4FFA-B1B6-F41C21DC6924}" type="datetimeFigureOut">
               <a:rPr lang="en-US" smtClean="0"/>
-              <a:t>1/7/2017</a:t>
+              <a:t>10/29/18</a:t>
             </a:fld>
             <a:endParaRPr lang="en-US"/>
           </a:p>
@@ -654,7 +654,7 @@
           <a:p>
             <a:fld id="{78C97017-6FC3-485B-9764-EAC9E56C1D49}" type="datetimeFigureOut">
               <a:rPr lang="en-US" smtClean="0"/>
-              <a:t>1/7/2017</a:t>
+              <a:t>10/29/18</a:t>
             </a:fld>
             <a:endParaRPr lang="en-US"/>
           </a:p>
@@ -822,7 +822,7 @@
           <a:p>
             <a:fld id="{78C97017-6FC3-485B-9764-EAC9E56C1D49}" type="datetimeFigureOut">
               <a:rPr lang="en-US" smtClean="0"/>
-              <a:t>1/7/2017</a:t>
+              <a:t>10/29/18</a:t>
             </a:fld>
             <a:endParaRPr lang="en-US"/>
           </a:p>
@@ -1000,7 +1000,7 @@
           <a:p>
             <a:fld id="{78C97017-6FC3-485B-9764-EAC9E56C1D49}" type="datetimeFigureOut">
               <a:rPr lang="en-US" smtClean="0"/>
-              <a:t>1/7/2017</a:t>
+              <a:t>10/29/18</a:t>
             </a:fld>
             <a:endParaRPr lang="en-US"/>
           </a:p>
@@ -1168,7 +1168,7 @@
           <a:p>
             <a:fld id="{78C97017-6FC3-485B-9764-EAC9E56C1D49}" type="datetimeFigureOut">
               <a:rPr lang="en-US" smtClean="0"/>
-              <a:t>1/7/2017</a:t>
+              <a:t>10/29/18</a:t>
             </a:fld>
             <a:endParaRPr lang="en-US"/>
           </a:p>
@@ -1413,7 +1413,7 @@
           <a:p>
             <a:fld id="{78C97017-6FC3-485B-9764-EAC9E56C1D49}" type="datetimeFigureOut">
               <a:rPr lang="en-US" smtClean="0"/>
-              <a:t>1/7/2017</a:t>
+              <a:t>10/29/18</a:t>
             </a:fld>
             <a:endParaRPr lang="en-US"/>
           </a:p>
@@ -1698,7 +1698,7 @@
           <a:p>
             <a:fld id="{78C97017-6FC3-485B-9764-EAC9E56C1D49}" type="datetimeFigureOut">
               <a:rPr lang="en-US" smtClean="0"/>
-              <a:t>1/7/2017</a:t>
+              <a:t>10/29/18</a:t>
             </a:fld>
             <a:endParaRPr lang="en-US"/>
           </a:p>
@@ -2117,7 +2117,7 @@
           <a:p>
             <a:fld id="{78C97017-6FC3-485B-9764-EAC9E56C1D49}" type="datetimeFigureOut">
               <a:rPr lang="en-US" smtClean="0"/>
-              <a:t>1/7/2017</a:t>
+              <a:t>10/29/18</a:t>
             </a:fld>
             <a:endParaRPr lang="en-US"/>
           </a:p>
@@ -2234,7 +2234,7 @@
           <a:p>
             <a:fld id="{78C97017-6FC3-485B-9764-EAC9E56C1D49}" type="datetimeFigureOut">
               <a:rPr lang="en-US" smtClean="0"/>
-              <a:t>1/7/2017</a:t>
+              <a:t>10/29/18</a:t>
             </a:fld>
             <a:endParaRPr lang="en-US"/>
           </a:p>
@@ -2329,7 +2329,7 @@
           <a:p>
             <a:fld id="{78C97017-6FC3-485B-9764-EAC9E56C1D49}" type="datetimeFigureOut">
               <a:rPr lang="en-US" smtClean="0"/>
-              <a:t>1/7/2017</a:t>
+              <a:t>10/29/18</a:t>
             </a:fld>
             <a:endParaRPr lang="en-US"/>
           </a:p>
@@ -2604,7 +2604,7 @@
           <a:p>
             <a:fld id="{78C97017-6FC3-485B-9764-EAC9E56C1D49}" type="datetimeFigureOut">
               <a:rPr lang="en-US" smtClean="0"/>
-              <a:t>1/7/2017</a:t>
+              <a:t>10/29/18</a:t>
             </a:fld>
             <a:endParaRPr lang="en-US"/>
           </a:p>
@@ -2856,7 +2856,7 @@
           <a:p>
             <a:fld id="{78C97017-6FC3-485B-9764-EAC9E56C1D49}" type="datetimeFigureOut">
               <a:rPr lang="en-US" smtClean="0"/>
-              <a:t>1/7/2017</a:t>
+              <a:t>10/29/18</a:t>
             </a:fld>
             <a:endParaRPr lang="en-US"/>
           </a:p>
@@ -3067,7 +3067,7 @@
           <a:p>
             <a:fld id="{78C97017-6FC3-485B-9764-EAC9E56C1D49}" type="datetimeFigureOut">
               <a:rPr lang="en-US" smtClean="0"/>
-              <a:t>1/7/2017</a:t>
+              <a:t>10/29/18</a:t>
             </a:fld>
             <a:endParaRPr lang="en-US"/>
           </a:p>
@@ -3945,7 +3945,7 @@
         </p:nvSpPr>
         <p:spPr>
           <a:xfrm>
-            <a:off x="2592527" y="4563759"/>
+            <a:off x="2592527" y="4639959"/>
             <a:ext cx="1093635" cy="236841"/>
           </a:xfrm>
           <a:prstGeom prst="rect">
@@ -4006,7 +4006,7 @@
         <p:spPr>
           <a:xfrm>
             <a:off x="2592526" y="3991960"/>
-            <a:ext cx="1093635" cy="236841"/>
+            <a:ext cx="1192715" cy="236841"/>
           </a:xfrm>
           <a:prstGeom prst="rect">
             <a:avLst/>
@@ -4045,7 +4045,7 @@
                   </a:schemeClr>
                 </a:solidFill>
               </a:rPr>
-              <a:t>PersonListPanel</a:t>
+              <a:t>ModuleListPanel</a:t>
             </a:r>
             <a:endParaRPr lang="en-SG" sz="1050" b="1" dirty="0">
               <a:solidFill>
@@ -4065,7 +4065,7 @@
         </p:nvSpPr>
         <p:spPr>
           <a:xfrm>
-            <a:off x="3839323" y="4228801"/>
+            <a:off x="4335355" y="4218189"/>
             <a:ext cx="1040906" cy="236841"/>
           </a:xfrm>
           <a:prstGeom prst="rect">
@@ -4105,7 +4105,7 @@
                   </a:schemeClr>
                 </a:solidFill>
               </a:rPr>
-              <a:t>PersonCard</a:t>
+              <a:t>ModuleCard</a:t>
             </a:r>
             <a:endParaRPr lang="en-SG" sz="1050" b="1" dirty="0">
               <a:solidFill>
@@ -4371,6 +4371,7 @@
         <p:nvCxnSpPr>
           <p:cNvPr id="47" name="Elbow Connector 63"/>
           <p:cNvCxnSpPr>
+            <a:cxnSpLocks/>
             <a:stCxn id="39" idx="2"/>
             <a:endCxn id="36" idx="1"/>
           </p:cNvCxnSpPr>
@@ -4412,14 +4413,14 @@
         <p:nvCxnSpPr>
           <p:cNvPr id="50" name="Elbow Connector 63"/>
           <p:cNvCxnSpPr>
-            <a:stCxn id="39" idx="2"/>
+            <a:cxnSpLocks/>
             <a:endCxn id="35" idx="1"/>
           </p:cNvCxnSpPr>
           <p:nvPr/>
         </p:nvCxnSpPr>
         <p:spPr>
           <a:xfrm rot="16200000" flipH="1">
-            <a:off x="1597249" y="3686901"/>
+            <a:off x="1597249" y="3763101"/>
             <a:ext cx="1814155" cy="176401"/>
           </a:xfrm>
           <a:prstGeom prst="bentConnector2">
@@ -4620,8 +4621,8 @@
         </p:nvCxnSpPr>
         <p:spPr>
           <a:xfrm rot="5400000">
-            <a:off x="4174488" y="2991741"/>
-            <a:ext cx="2061222" cy="649740"/>
+            <a:off x="4427810" y="3234451"/>
+            <a:ext cx="2050610" cy="153708"/>
           </a:xfrm>
           <a:prstGeom prst="bentConnector2">
             <a:avLst/>
@@ -4743,8 +4744,8 @@
         </p:nvCxnSpPr>
         <p:spPr>
           <a:xfrm rot="5400000">
-            <a:off x="3409976" y="2562187"/>
-            <a:ext cx="2396180" cy="1843807"/>
+            <a:off x="3371876" y="2600287"/>
+            <a:ext cx="2472380" cy="1843807"/>
           </a:xfrm>
           <a:prstGeom prst="bentConnector2">
             <a:avLst/>
@@ -5161,18 +5162,20 @@
         <p:nvCxnSpPr>
           <p:cNvPr id="137" name="Elbow Connector 136"/>
           <p:cNvCxnSpPr>
-            <a:stCxn id="36" idx="2"/>
+            <a:cxnSpLocks/>
             <a:endCxn id="37" idx="1"/>
           </p:cNvCxnSpPr>
           <p:nvPr/>
         </p:nvCxnSpPr>
         <p:spPr>
-          <a:xfrm rot="16200000" flipH="1">
-            <a:off x="3430123" y="3938021"/>
-            <a:ext cx="118421" cy="699979"/>
-          </a:xfrm>
-          <a:prstGeom prst="bentConnector2">
-            <a:avLst/>
+          <a:xfrm>
+            <a:off x="3785241" y="4160156"/>
+            <a:ext cx="550114" cy="176454"/>
+          </a:xfrm>
+          <a:prstGeom prst="bentConnector3">
+            <a:avLst>
+              <a:gd name="adj1" fmla="val 50000"/>
+            </a:avLst>
           </a:prstGeom>
           <a:ln w="19050">
             <a:solidFill>
@@ -5202,6 +5205,7 @@
         <p:nvCxnSpPr>
           <p:cNvPr id="140" name="Elbow Connector 63"/>
           <p:cNvCxnSpPr>
+            <a:cxnSpLocks/>
             <a:stCxn id="16" idx="3"/>
             <a:endCxn id="36" idx="3"/>
           </p:cNvCxnSpPr>
@@ -5209,8 +5213,8 @@
         </p:nvCxnSpPr>
         <p:spPr>
           <a:xfrm rot="5400000">
-            <a:off x="3695875" y="2276286"/>
-            <a:ext cx="1824381" cy="1843808"/>
+            <a:off x="3745415" y="2325826"/>
+            <a:ext cx="1824381" cy="1744728"/>
           </a:xfrm>
           <a:prstGeom prst="bentConnector2">
             <a:avLst/>
@@ -5509,6 +5513,167 @@
           </a:p>
         </p:txBody>
       </p:sp>
+      <p:sp>
+        <p:nvSpPr>
+          <p:cNvPr id="45" name="Rectangle 11">
+            <a:extLst>
+              <a:ext uri="{FF2B5EF4-FFF2-40B4-BE49-F238E27FC236}">
+                <a16:creationId xmlns:a16="http://schemas.microsoft.com/office/drawing/2014/main" id="{F73ED6E0-6B09-4444-9CAD-A3A813A001C8}"/>
+              </a:ext>
+            </a:extLst>
+          </p:cNvPr>
+          <p:cNvSpPr/>
+          <p:nvPr/>
+        </p:nvSpPr>
+        <p:spPr>
+          <a:xfrm>
+            <a:off x="2594605" y="4335159"/>
+            <a:ext cx="1192715" cy="236841"/>
+          </a:xfrm>
+          <a:prstGeom prst="rect">
+            <a:avLst/>
+          </a:prstGeom>
+          <a:ln w="19050">
+            <a:solidFill>
+              <a:schemeClr val="accent3"/>
+            </a:solidFill>
+          </a:ln>
+          <a:effectLst/>
+        </p:spPr>
+        <p:style>
+          <a:lnRef idx="1">
+            <a:schemeClr val="accent3"/>
+          </a:lnRef>
+          <a:fillRef idx="2">
+            <a:schemeClr val="accent3"/>
+          </a:fillRef>
+          <a:effectRef idx="1">
+            <a:schemeClr val="accent3"/>
+          </a:effectRef>
+          <a:fontRef idx="minor">
+            <a:schemeClr val="dk1"/>
+          </a:fontRef>
+        </p:style>
+        <p:txBody>
+          <a:bodyPr rtlCol="0" anchor="ctr"/>
+          <a:lstStyle/>
+          <a:p>
+            <a:pPr algn="ctr"/>
+            <a:r>
+              <a:rPr lang="en-US" sz="1050" b="1" dirty="0">
+                <a:solidFill>
+                  <a:schemeClr val="accent3">
+                    <a:lumMod val="75000"/>
+                  </a:schemeClr>
+                </a:solidFill>
+              </a:rPr>
+              <a:t>ModuleListPanel2</a:t>
+            </a:r>
+            <a:endParaRPr lang="en-SG" sz="1050" b="1" dirty="0">
+              <a:solidFill>
+                <a:schemeClr val="accent3">
+                  <a:lumMod val="75000"/>
+                </a:schemeClr>
+              </a:solidFill>
+            </a:endParaRPr>
+          </a:p>
+        </p:txBody>
+      </p:sp>
+      <p:cxnSp>
+        <p:nvCxnSpPr>
+          <p:cNvPr id="49" name="Elbow Connector 48">
+            <a:extLst>
+              <a:ext uri="{FF2B5EF4-FFF2-40B4-BE49-F238E27FC236}">
+                <a16:creationId xmlns:a16="http://schemas.microsoft.com/office/drawing/2014/main" id="{3ABC7D55-AA1B-1342-A29C-5A1EB4AFCB8B}"/>
+              </a:ext>
+            </a:extLst>
+          </p:cNvPr>
+          <p:cNvCxnSpPr>
+            <a:cxnSpLocks/>
+            <a:endCxn id="37" idx="1"/>
+          </p:cNvCxnSpPr>
+          <p:nvPr/>
+        </p:nvCxnSpPr>
+        <p:spPr>
+          <a:xfrm flipV="1">
+            <a:off x="3787600" y="4336610"/>
+            <a:ext cx="547755" cy="93878"/>
+          </a:xfrm>
+          <a:prstGeom prst="bentConnector3">
+            <a:avLst>
+              <a:gd name="adj1" fmla="val 50000"/>
+            </a:avLst>
+          </a:prstGeom>
+          <a:ln w="19050">
+            <a:solidFill>
+              <a:schemeClr val="accent3"/>
+            </a:solidFill>
+            <a:headEnd type="none" w="med" len="med"/>
+            <a:tailEnd type="arrow" w="med" len="med"/>
+          </a:ln>
+          <a:effectLst/>
+        </p:spPr>
+        <p:style>
+          <a:lnRef idx="1">
+            <a:schemeClr val="accent2"/>
+          </a:lnRef>
+          <a:fillRef idx="2">
+            <a:schemeClr val="accent2"/>
+          </a:fillRef>
+          <a:effectRef idx="1">
+            <a:schemeClr val="accent2"/>
+          </a:effectRef>
+          <a:fontRef idx="minor">
+            <a:schemeClr val="dk1"/>
+          </a:fontRef>
+        </p:style>
+      </p:cxnSp>
+      <p:cxnSp>
+        <p:nvCxnSpPr>
+          <p:cNvPr id="52" name="Elbow Connector 63">
+            <a:extLst>
+              <a:ext uri="{FF2B5EF4-FFF2-40B4-BE49-F238E27FC236}">
+                <a16:creationId xmlns:a16="http://schemas.microsoft.com/office/drawing/2014/main" id="{42635FD3-E6CC-0142-A59D-19D887F20B8C}"/>
+              </a:ext>
+            </a:extLst>
+          </p:cNvPr>
+          <p:cNvCxnSpPr>
+            <a:cxnSpLocks/>
+          </p:cNvCxnSpPr>
+          <p:nvPr/>
+        </p:nvCxnSpPr>
+        <p:spPr>
+          <a:xfrm rot="16200000" flipH="1">
+            <a:off x="1881422" y="3769265"/>
+            <a:ext cx="1242356" cy="176400"/>
+          </a:xfrm>
+          <a:prstGeom prst="bentConnector2">
+            <a:avLst/>
+          </a:prstGeom>
+          <a:ln w="19050">
+            <a:solidFill>
+              <a:schemeClr val="accent3"/>
+            </a:solidFill>
+            <a:headEnd type="none" w="med" len="med"/>
+            <a:tailEnd type="arrow" w="med" len="med"/>
+          </a:ln>
+          <a:effectLst/>
+        </p:spPr>
+        <p:style>
+          <a:lnRef idx="1">
+            <a:schemeClr val="accent2"/>
+          </a:lnRef>
+          <a:fillRef idx="2">
+            <a:schemeClr val="accent2"/>
+          </a:fillRef>
+          <a:effectRef idx="1">
+            <a:schemeClr val="accent2"/>
+          </a:effectRef>
+          <a:fontRef idx="minor">
+            <a:schemeClr val="dk1"/>
+          </a:fontRef>
+        </p:style>
+      </p:cxnSp>
     </p:spTree>
     <p:extLst>
       <p:ext uri="{BB962C8B-B14F-4D97-AF65-F5344CB8AC3E}">

</xml_diff>